<commit_message>
Better text extraction and ability to extract text from drawings
</commit_message>
<xml_diff>
--- a/test.pptx
+++ b/test.pptx
@@ -7,6 +7,7 @@
   <p:sldIdLst>
     <p:sldId id="256" r:id="rId2"/>
     <p:sldId id="257" r:id="rId3"/>
+    <p:sldId id="258" r:id="rId4"/>
   </p:sldIdLst>
   <p:sldSz cx="12192000" cy="6858000"/>
   <p:notesSz cx="6858000" cy="9144000"/>
@@ -113,6 +114,860 @@
 </p:presentation>
 </file>
 
+<file path=ppt/charts/chart1.xml><?xml version="1.0" encoding="utf-8"?>
+<c:chartSpace xmlns:c="http://schemas.openxmlformats.org/drawingml/2006/chart" xmlns:a="http://schemas.openxmlformats.org/drawingml/2006/main" xmlns:r="http://schemas.openxmlformats.org/officeDocument/2006/relationships" xmlns:c16r2="http://schemas.microsoft.com/office/drawing/2015/06/chart">
+  <c:date1904 val="0"/>
+  <c:lang val="en-US"/>
+  <c:roundedCorners val="0"/>
+  <mc:AlternateContent xmlns:mc="http://schemas.openxmlformats.org/markup-compatibility/2006">
+    <mc:Choice xmlns:c14="http://schemas.microsoft.com/office/drawing/2007/8/2/chart" Requires="c14">
+      <c14:style val="102"/>
+    </mc:Choice>
+    <mc:Fallback>
+      <c:style val="2"/>
+    </mc:Fallback>
+  </mc:AlternateContent>
+  <c:chart>
+    <c:title>
+      <c:overlay val="0"/>
+      <c:spPr>
+        <a:noFill/>
+        <a:ln>
+          <a:noFill/>
+        </a:ln>
+        <a:effectLst/>
+      </c:spPr>
+      <c:txPr>
+        <a:bodyPr rot="0" spcFirstLastPara="1" vertOverflow="ellipsis" vert="horz" wrap="square" anchor="ctr" anchorCtr="1"/>
+        <a:lstStyle/>
+        <a:p>
+          <a:pPr>
+            <a:defRPr sz="1400" b="0" i="0" u="none" strike="noStrike" kern="1200" spc="0" baseline="0">
+              <a:solidFill>
+                <a:schemeClr val="tx1">
+                  <a:lumMod val="65000"/>
+                  <a:lumOff val="35000"/>
+                </a:schemeClr>
+              </a:solidFill>
+              <a:latin typeface="+mn-lt"/>
+              <a:ea typeface="+mn-ea"/>
+              <a:cs typeface="+mn-cs"/>
+            </a:defRPr>
+          </a:pPr>
+          <a:endParaRPr lang="en-US"/>
+        </a:p>
+      </c:txPr>
+    </c:title>
+    <c:autoTitleDeleted val="0"/>
+    <c:plotArea>
+      <c:layout/>
+      <c:barChart>
+        <c:barDir val="col"/>
+        <c:grouping val="clustered"/>
+        <c:varyColors val="0"/>
+        <c:ser>
+          <c:idx val="0"/>
+          <c:order val="0"/>
+          <c:spPr>
+            <a:solidFill>
+              <a:schemeClr val="accent1"/>
+            </a:solidFill>
+            <a:ln>
+              <a:noFill/>
+            </a:ln>
+            <a:effectLst/>
+          </c:spPr>
+          <c:invertIfNegative val="0"/>
+          <c:val>
+            <c:numRef>
+              <c:f>Sheet1!$A$2:$C$2</c:f>
+              <c:numCache>
+                <c:formatCode>General</c:formatCode>
+                <c:ptCount val="3"/>
+                <c:pt idx="0">
+                  <c:v>10</c:v>
+                </c:pt>
+                <c:pt idx="1">
+                  <c:v>15</c:v>
+                </c:pt>
+                <c:pt idx="2">
+                  <c:v>20</c:v>
+                </c:pt>
+              </c:numCache>
+            </c:numRef>
+          </c:val>
+          <c:extLst>
+            <c:ext xmlns:c15="http://schemas.microsoft.com/office/drawing/2012/chart" uri="{02D57815-91ED-43cb-92C2-25804820EDAC}">
+              <c15:filteredCategoryTitle>
+                <c15:cat>
+                  <c:strRef>
+                    <c:extLst>
+                      <c:ext uri="{02D57815-91ED-43cb-92C2-25804820EDAC}">
+                        <c15:formulaRef>
+                          <c15:sqref>Sheet1!$A$1:$C$1</c15:sqref>
+                        </c15:formulaRef>
+                      </c:ext>
+                    </c:extLst>
+                    <c:strCache>
+                      <c:ptCount val="3"/>
+                      <c:pt idx="0">
+                        <c:v>A</c:v>
+                      </c:pt>
+                      <c:pt idx="1">
+                        <c:v>B</c:v>
+                      </c:pt>
+                      <c:pt idx="2">
+                        <c:v>C</c:v>
+                      </c:pt>
+                    </c:strCache>
+                  </c:strRef>
+                </c15:cat>
+              </c15:filteredCategoryTitle>
+            </c:ext>
+            <c:ext xmlns:c16="http://schemas.microsoft.com/office/drawing/2014/chart" uri="{C3380CC4-5D6E-409C-BE32-E72D297353CC}">
+              <c16:uniqueId val="{00000000-8536-495B-BD00-7246F333686D}"/>
+            </c:ext>
+          </c:extLst>
+        </c:ser>
+        <c:dLbls>
+          <c:showLegendKey val="0"/>
+          <c:showVal val="0"/>
+          <c:showCatName val="0"/>
+          <c:showSerName val="0"/>
+          <c:showPercent val="0"/>
+          <c:showBubbleSize val="0"/>
+        </c:dLbls>
+        <c:gapWidth val="219"/>
+        <c:overlap val="-27"/>
+        <c:axId val="397170832"/>
+        <c:axId val="397171488"/>
+      </c:barChart>
+      <c:catAx>
+        <c:axId val="397170832"/>
+        <c:scaling>
+          <c:orientation val="minMax"/>
+        </c:scaling>
+        <c:delete val="0"/>
+        <c:axPos val="b"/>
+        <c:numFmt formatCode="General" sourceLinked="1"/>
+        <c:majorTickMark val="none"/>
+        <c:minorTickMark val="none"/>
+        <c:tickLblPos val="nextTo"/>
+        <c:spPr>
+          <a:noFill/>
+          <a:ln w="9525" cap="flat" cmpd="sng" algn="ctr">
+            <a:solidFill>
+              <a:schemeClr val="tx1">
+                <a:lumMod val="15000"/>
+                <a:lumOff val="85000"/>
+              </a:schemeClr>
+            </a:solidFill>
+            <a:round/>
+          </a:ln>
+          <a:effectLst/>
+        </c:spPr>
+        <c:txPr>
+          <a:bodyPr rot="-60000000" spcFirstLastPara="1" vertOverflow="ellipsis" vert="horz" wrap="square" anchor="ctr" anchorCtr="1"/>
+          <a:lstStyle/>
+          <a:p>
+            <a:pPr>
+              <a:defRPr sz="900" b="0" i="0" u="none" strike="noStrike" kern="1200" baseline="0">
+                <a:solidFill>
+                  <a:schemeClr val="tx1">
+                    <a:lumMod val="65000"/>
+                    <a:lumOff val="35000"/>
+                  </a:schemeClr>
+                </a:solidFill>
+                <a:latin typeface="+mn-lt"/>
+                <a:ea typeface="+mn-ea"/>
+                <a:cs typeface="+mn-cs"/>
+              </a:defRPr>
+            </a:pPr>
+            <a:endParaRPr lang="en-US"/>
+          </a:p>
+        </c:txPr>
+        <c:crossAx val="397171488"/>
+        <c:crosses val="autoZero"/>
+        <c:auto val="1"/>
+        <c:lblAlgn val="ctr"/>
+        <c:lblOffset val="100"/>
+        <c:noMultiLvlLbl val="0"/>
+      </c:catAx>
+      <c:valAx>
+        <c:axId val="397171488"/>
+        <c:scaling>
+          <c:orientation val="minMax"/>
+        </c:scaling>
+        <c:delete val="0"/>
+        <c:axPos val="l"/>
+        <c:majorGridlines>
+          <c:spPr>
+            <a:ln w="9525" cap="flat" cmpd="sng" algn="ctr">
+              <a:solidFill>
+                <a:schemeClr val="tx1">
+                  <a:lumMod val="15000"/>
+                  <a:lumOff val="85000"/>
+                </a:schemeClr>
+              </a:solidFill>
+              <a:round/>
+            </a:ln>
+            <a:effectLst/>
+          </c:spPr>
+        </c:majorGridlines>
+        <c:numFmt formatCode="General" sourceLinked="1"/>
+        <c:majorTickMark val="none"/>
+        <c:minorTickMark val="none"/>
+        <c:tickLblPos val="nextTo"/>
+        <c:spPr>
+          <a:noFill/>
+          <a:ln>
+            <a:noFill/>
+          </a:ln>
+          <a:effectLst/>
+        </c:spPr>
+        <c:txPr>
+          <a:bodyPr rot="-60000000" spcFirstLastPara="1" vertOverflow="ellipsis" vert="horz" wrap="square" anchor="ctr" anchorCtr="1"/>
+          <a:lstStyle/>
+          <a:p>
+            <a:pPr>
+              <a:defRPr sz="900" b="0" i="0" u="none" strike="noStrike" kern="1200" baseline="0">
+                <a:solidFill>
+                  <a:schemeClr val="tx1">
+                    <a:lumMod val="65000"/>
+                    <a:lumOff val="35000"/>
+                  </a:schemeClr>
+                </a:solidFill>
+                <a:latin typeface="+mn-lt"/>
+                <a:ea typeface="+mn-ea"/>
+                <a:cs typeface="+mn-cs"/>
+              </a:defRPr>
+            </a:pPr>
+            <a:endParaRPr lang="en-US"/>
+          </a:p>
+        </c:txPr>
+        <c:crossAx val="397170832"/>
+        <c:crosses val="autoZero"/>
+        <c:crossBetween val="between"/>
+      </c:valAx>
+      <c:spPr>
+        <a:noFill/>
+        <a:ln>
+          <a:noFill/>
+        </a:ln>
+        <a:effectLst/>
+      </c:spPr>
+    </c:plotArea>
+    <c:plotVisOnly val="1"/>
+    <c:dispBlanksAs val="gap"/>
+    <c:showDLblsOverMax val="0"/>
+  </c:chart>
+  <c:spPr>
+    <a:noFill/>
+    <a:ln>
+      <a:noFill/>
+    </a:ln>
+    <a:effectLst/>
+  </c:spPr>
+  <c:txPr>
+    <a:bodyPr/>
+    <a:lstStyle/>
+    <a:p>
+      <a:pPr>
+        <a:defRPr/>
+      </a:pPr>
+      <a:endParaRPr lang="en-US"/>
+    </a:p>
+  </c:txPr>
+  <c:externalData r:id="rId3">
+    <c:autoUpdate val="0"/>
+  </c:externalData>
+  <c:userShapes r:id="rId4"/>
+</c:chartSpace>
+</file>
+
+<file path=ppt/charts/colors1.xml><?xml version="1.0" encoding="utf-8"?>
+<cs:colorStyle xmlns:cs="http://schemas.microsoft.com/office/drawing/2012/chartStyle" xmlns:a="http://schemas.openxmlformats.org/drawingml/2006/main" meth="cycle" id="10">
+  <a:schemeClr val="accent1"/>
+  <a:schemeClr val="accent2"/>
+  <a:schemeClr val="accent3"/>
+  <a:schemeClr val="accent4"/>
+  <a:schemeClr val="accent5"/>
+  <a:schemeClr val="accent6"/>
+  <cs:variation/>
+  <cs:variation>
+    <a:lumMod val="60000"/>
+  </cs:variation>
+  <cs:variation>
+    <a:lumMod val="80000"/>
+    <a:lumOff val="20000"/>
+  </cs:variation>
+  <cs:variation>
+    <a:lumMod val="80000"/>
+  </cs:variation>
+  <cs:variation>
+    <a:lumMod val="60000"/>
+    <a:lumOff val="40000"/>
+  </cs:variation>
+  <cs:variation>
+    <a:lumMod val="50000"/>
+  </cs:variation>
+  <cs:variation>
+    <a:lumMod val="70000"/>
+    <a:lumOff val="30000"/>
+  </cs:variation>
+  <cs:variation>
+    <a:lumMod val="70000"/>
+  </cs:variation>
+  <cs:variation>
+    <a:lumMod val="50000"/>
+    <a:lumOff val="50000"/>
+  </cs:variation>
+</cs:colorStyle>
+</file>
+
+<file path=ppt/charts/style1.xml><?xml version="1.0" encoding="utf-8"?>
+<cs:chartStyle xmlns:cs="http://schemas.microsoft.com/office/drawing/2012/chartStyle" xmlns:a="http://schemas.openxmlformats.org/drawingml/2006/main" id="201">
+  <cs:axisTitle>
+    <cs:lnRef idx="0"/>
+    <cs:fillRef idx="0"/>
+    <cs:effectRef idx="0"/>
+    <cs:fontRef idx="minor">
+      <a:schemeClr val="tx1">
+        <a:lumMod val="65000"/>
+        <a:lumOff val="35000"/>
+      </a:schemeClr>
+    </cs:fontRef>
+    <cs:defRPr sz="1000" kern="1200"/>
+  </cs:axisTitle>
+  <cs:categoryAxis>
+    <cs:lnRef idx="0"/>
+    <cs:fillRef idx="0"/>
+    <cs:effectRef idx="0"/>
+    <cs:fontRef idx="minor">
+      <a:schemeClr val="tx1">
+        <a:lumMod val="65000"/>
+        <a:lumOff val="35000"/>
+      </a:schemeClr>
+    </cs:fontRef>
+    <cs:spPr>
+      <a:ln w="9525" cap="flat" cmpd="sng" algn="ctr">
+        <a:solidFill>
+          <a:schemeClr val="tx1">
+            <a:lumMod val="15000"/>
+            <a:lumOff val="85000"/>
+          </a:schemeClr>
+        </a:solidFill>
+        <a:round/>
+      </a:ln>
+    </cs:spPr>
+    <cs:defRPr sz="900" kern="1200"/>
+  </cs:categoryAxis>
+  <cs:chartArea mods="allowNoFillOverride allowNoLineOverride">
+    <cs:lnRef idx="0"/>
+    <cs:fillRef idx="0"/>
+    <cs:effectRef idx="0"/>
+    <cs:fontRef idx="minor">
+      <a:schemeClr val="tx1"/>
+    </cs:fontRef>
+    <cs:spPr>
+      <a:solidFill>
+        <a:schemeClr val="bg1"/>
+      </a:solidFill>
+      <a:ln w="9525" cap="flat" cmpd="sng" algn="ctr">
+        <a:solidFill>
+          <a:schemeClr val="tx1">
+            <a:lumMod val="15000"/>
+            <a:lumOff val="85000"/>
+          </a:schemeClr>
+        </a:solidFill>
+        <a:round/>
+      </a:ln>
+    </cs:spPr>
+    <cs:defRPr sz="1000" kern="1200"/>
+  </cs:chartArea>
+  <cs:dataLabel>
+    <cs:lnRef idx="0"/>
+    <cs:fillRef idx="0"/>
+    <cs:effectRef idx="0"/>
+    <cs:fontRef idx="minor">
+      <a:schemeClr val="tx1">
+        <a:lumMod val="75000"/>
+        <a:lumOff val="25000"/>
+      </a:schemeClr>
+    </cs:fontRef>
+    <cs:defRPr sz="900" kern="1200"/>
+  </cs:dataLabel>
+  <cs:dataLabelCallout>
+    <cs:lnRef idx="0"/>
+    <cs:fillRef idx="0"/>
+    <cs:effectRef idx="0"/>
+    <cs:fontRef idx="minor">
+      <a:schemeClr val="dk1">
+        <a:lumMod val="65000"/>
+        <a:lumOff val="35000"/>
+      </a:schemeClr>
+    </cs:fontRef>
+    <cs:spPr>
+      <a:solidFill>
+        <a:schemeClr val="lt1"/>
+      </a:solidFill>
+      <a:ln>
+        <a:solidFill>
+          <a:schemeClr val="dk1">
+            <a:lumMod val="25000"/>
+            <a:lumOff val="75000"/>
+          </a:schemeClr>
+        </a:solidFill>
+      </a:ln>
+    </cs:spPr>
+    <cs:defRPr sz="900" kern="1200"/>
+    <cs:bodyPr rot="0" spcFirstLastPara="1" vertOverflow="clip" horzOverflow="clip" vert="horz" wrap="square" lIns="36576" tIns="18288" rIns="36576" bIns="18288" anchor="ctr" anchorCtr="1">
+      <a:spAutoFit/>
+    </cs:bodyPr>
+  </cs:dataLabelCallout>
+  <cs:dataPoint>
+    <cs:lnRef idx="0"/>
+    <cs:fillRef idx="1">
+      <cs:styleClr val="auto"/>
+    </cs:fillRef>
+    <cs:effectRef idx="0"/>
+    <cs:fontRef idx="minor">
+      <a:schemeClr val="tx1"/>
+    </cs:fontRef>
+  </cs:dataPoint>
+  <cs:dataPoint3D>
+    <cs:lnRef idx="0"/>
+    <cs:fillRef idx="1">
+      <cs:styleClr val="auto"/>
+    </cs:fillRef>
+    <cs:effectRef idx="0"/>
+    <cs:fontRef idx="minor">
+      <a:schemeClr val="tx1"/>
+    </cs:fontRef>
+  </cs:dataPoint3D>
+  <cs:dataPointLine>
+    <cs:lnRef idx="0">
+      <cs:styleClr val="auto"/>
+    </cs:lnRef>
+    <cs:fillRef idx="1"/>
+    <cs:effectRef idx="0"/>
+    <cs:fontRef idx="minor">
+      <a:schemeClr val="tx1"/>
+    </cs:fontRef>
+    <cs:spPr>
+      <a:ln w="28575" cap="rnd">
+        <a:solidFill>
+          <a:schemeClr val="phClr"/>
+        </a:solidFill>
+        <a:round/>
+      </a:ln>
+    </cs:spPr>
+  </cs:dataPointLine>
+  <cs:dataPointMarker>
+    <cs:lnRef idx="0">
+      <cs:styleClr val="auto"/>
+    </cs:lnRef>
+    <cs:fillRef idx="1">
+      <cs:styleClr val="auto"/>
+    </cs:fillRef>
+    <cs:effectRef idx="0"/>
+    <cs:fontRef idx="minor">
+      <a:schemeClr val="tx1"/>
+    </cs:fontRef>
+    <cs:spPr>
+      <a:ln w="9525">
+        <a:solidFill>
+          <a:schemeClr val="phClr"/>
+        </a:solidFill>
+      </a:ln>
+    </cs:spPr>
+  </cs:dataPointMarker>
+  <cs:dataPointMarkerLayout symbol="circle" size="5"/>
+  <cs:dataPointWireframe>
+    <cs:lnRef idx="0">
+      <cs:styleClr val="auto"/>
+    </cs:lnRef>
+    <cs:fillRef idx="1"/>
+    <cs:effectRef idx="0"/>
+    <cs:fontRef idx="minor">
+      <a:schemeClr val="tx1"/>
+    </cs:fontRef>
+    <cs:spPr>
+      <a:ln w="9525" cap="rnd">
+        <a:solidFill>
+          <a:schemeClr val="phClr"/>
+        </a:solidFill>
+        <a:round/>
+      </a:ln>
+    </cs:spPr>
+  </cs:dataPointWireframe>
+  <cs:dataTable>
+    <cs:lnRef idx="0"/>
+    <cs:fillRef idx="0"/>
+    <cs:effectRef idx="0"/>
+    <cs:fontRef idx="minor">
+      <a:schemeClr val="tx1">
+        <a:lumMod val="65000"/>
+        <a:lumOff val="35000"/>
+      </a:schemeClr>
+    </cs:fontRef>
+    <cs:spPr>
+      <a:noFill/>
+      <a:ln w="9525" cap="flat" cmpd="sng" algn="ctr">
+        <a:solidFill>
+          <a:schemeClr val="tx1">
+            <a:lumMod val="15000"/>
+            <a:lumOff val="85000"/>
+          </a:schemeClr>
+        </a:solidFill>
+        <a:round/>
+      </a:ln>
+    </cs:spPr>
+    <cs:defRPr sz="900" kern="1200"/>
+  </cs:dataTable>
+  <cs:downBar>
+    <cs:lnRef idx="0"/>
+    <cs:fillRef idx="0"/>
+    <cs:effectRef idx="0"/>
+    <cs:fontRef idx="minor">
+      <a:schemeClr val="dk1"/>
+    </cs:fontRef>
+    <cs:spPr>
+      <a:solidFill>
+        <a:schemeClr val="dk1">
+          <a:lumMod val="65000"/>
+          <a:lumOff val="35000"/>
+        </a:schemeClr>
+      </a:solidFill>
+      <a:ln w="9525">
+        <a:solidFill>
+          <a:schemeClr val="tx1">
+            <a:lumMod val="65000"/>
+            <a:lumOff val="35000"/>
+          </a:schemeClr>
+        </a:solidFill>
+      </a:ln>
+    </cs:spPr>
+  </cs:downBar>
+  <cs:dropLine>
+    <cs:lnRef idx="0"/>
+    <cs:fillRef idx="0"/>
+    <cs:effectRef idx="0"/>
+    <cs:fontRef idx="minor">
+      <a:schemeClr val="tx1"/>
+    </cs:fontRef>
+    <cs:spPr>
+      <a:ln w="9525" cap="flat" cmpd="sng" algn="ctr">
+        <a:solidFill>
+          <a:schemeClr val="tx1">
+            <a:lumMod val="35000"/>
+            <a:lumOff val="65000"/>
+          </a:schemeClr>
+        </a:solidFill>
+        <a:round/>
+      </a:ln>
+    </cs:spPr>
+  </cs:dropLine>
+  <cs:errorBar>
+    <cs:lnRef idx="0"/>
+    <cs:fillRef idx="0"/>
+    <cs:effectRef idx="0"/>
+    <cs:fontRef idx="minor">
+      <a:schemeClr val="tx1"/>
+    </cs:fontRef>
+    <cs:spPr>
+      <a:ln w="9525" cap="flat" cmpd="sng" algn="ctr">
+        <a:solidFill>
+          <a:schemeClr val="tx1">
+            <a:lumMod val="65000"/>
+            <a:lumOff val="35000"/>
+          </a:schemeClr>
+        </a:solidFill>
+        <a:round/>
+      </a:ln>
+    </cs:spPr>
+  </cs:errorBar>
+  <cs:floor>
+    <cs:lnRef idx="0"/>
+    <cs:fillRef idx="0"/>
+    <cs:effectRef idx="0"/>
+    <cs:fontRef idx="minor">
+      <a:schemeClr val="tx1"/>
+    </cs:fontRef>
+    <cs:spPr>
+      <a:noFill/>
+      <a:ln>
+        <a:noFill/>
+      </a:ln>
+    </cs:spPr>
+  </cs:floor>
+  <cs:gridlineMajor>
+    <cs:lnRef idx="0"/>
+    <cs:fillRef idx="0"/>
+    <cs:effectRef idx="0"/>
+    <cs:fontRef idx="minor">
+      <a:schemeClr val="tx1"/>
+    </cs:fontRef>
+    <cs:spPr>
+      <a:ln w="9525" cap="flat" cmpd="sng" algn="ctr">
+        <a:solidFill>
+          <a:schemeClr val="tx1">
+            <a:lumMod val="15000"/>
+            <a:lumOff val="85000"/>
+          </a:schemeClr>
+        </a:solidFill>
+        <a:round/>
+      </a:ln>
+    </cs:spPr>
+  </cs:gridlineMajor>
+  <cs:gridlineMinor>
+    <cs:lnRef idx="0"/>
+    <cs:fillRef idx="0"/>
+    <cs:effectRef idx="0"/>
+    <cs:fontRef idx="minor">
+      <a:schemeClr val="tx1"/>
+    </cs:fontRef>
+    <cs:spPr>
+      <a:ln w="9525" cap="flat" cmpd="sng" algn="ctr">
+        <a:solidFill>
+          <a:schemeClr val="tx1">
+            <a:lumMod val="5000"/>
+            <a:lumOff val="95000"/>
+          </a:schemeClr>
+        </a:solidFill>
+        <a:round/>
+      </a:ln>
+    </cs:spPr>
+  </cs:gridlineMinor>
+  <cs:hiLoLine>
+    <cs:lnRef idx="0"/>
+    <cs:fillRef idx="0"/>
+    <cs:effectRef idx="0"/>
+    <cs:fontRef idx="minor">
+      <a:schemeClr val="tx1"/>
+    </cs:fontRef>
+    <cs:spPr>
+      <a:ln w="9525" cap="flat" cmpd="sng" algn="ctr">
+        <a:solidFill>
+          <a:schemeClr val="tx1">
+            <a:lumMod val="75000"/>
+            <a:lumOff val="25000"/>
+          </a:schemeClr>
+        </a:solidFill>
+        <a:round/>
+      </a:ln>
+    </cs:spPr>
+  </cs:hiLoLine>
+  <cs:leaderLine>
+    <cs:lnRef idx="0"/>
+    <cs:fillRef idx="0"/>
+    <cs:effectRef idx="0"/>
+    <cs:fontRef idx="minor">
+      <a:schemeClr val="tx1"/>
+    </cs:fontRef>
+    <cs:spPr>
+      <a:ln w="9525" cap="flat" cmpd="sng" algn="ctr">
+        <a:solidFill>
+          <a:schemeClr val="tx1">
+            <a:lumMod val="35000"/>
+            <a:lumOff val="65000"/>
+          </a:schemeClr>
+        </a:solidFill>
+        <a:round/>
+      </a:ln>
+    </cs:spPr>
+  </cs:leaderLine>
+  <cs:legend>
+    <cs:lnRef idx="0"/>
+    <cs:fillRef idx="0"/>
+    <cs:effectRef idx="0"/>
+    <cs:fontRef idx="minor">
+      <a:schemeClr val="tx1">
+        <a:lumMod val="65000"/>
+        <a:lumOff val="35000"/>
+      </a:schemeClr>
+    </cs:fontRef>
+    <cs:defRPr sz="900" kern="1200"/>
+  </cs:legend>
+  <cs:plotArea mods="allowNoFillOverride allowNoLineOverride">
+    <cs:lnRef idx="0"/>
+    <cs:fillRef idx="0"/>
+    <cs:effectRef idx="0"/>
+    <cs:fontRef idx="minor">
+      <a:schemeClr val="tx1"/>
+    </cs:fontRef>
+  </cs:plotArea>
+  <cs:plotArea3D mods="allowNoFillOverride allowNoLineOverride">
+    <cs:lnRef idx="0"/>
+    <cs:fillRef idx="0"/>
+    <cs:effectRef idx="0"/>
+    <cs:fontRef idx="minor">
+      <a:schemeClr val="tx1"/>
+    </cs:fontRef>
+  </cs:plotArea3D>
+  <cs:seriesAxis>
+    <cs:lnRef idx="0"/>
+    <cs:fillRef idx="0"/>
+    <cs:effectRef idx="0"/>
+    <cs:fontRef idx="minor">
+      <a:schemeClr val="tx1">
+        <a:lumMod val="65000"/>
+        <a:lumOff val="35000"/>
+      </a:schemeClr>
+    </cs:fontRef>
+    <cs:defRPr sz="900" kern="1200"/>
+  </cs:seriesAxis>
+  <cs:seriesLine>
+    <cs:lnRef idx="0"/>
+    <cs:fillRef idx="0"/>
+    <cs:effectRef idx="0"/>
+    <cs:fontRef idx="minor">
+      <a:schemeClr val="tx1"/>
+    </cs:fontRef>
+    <cs:spPr>
+      <a:ln w="9525" cap="flat" cmpd="sng" algn="ctr">
+        <a:solidFill>
+          <a:schemeClr val="tx1">
+            <a:lumMod val="35000"/>
+            <a:lumOff val="65000"/>
+          </a:schemeClr>
+        </a:solidFill>
+        <a:round/>
+      </a:ln>
+    </cs:spPr>
+  </cs:seriesLine>
+  <cs:title>
+    <cs:lnRef idx="0"/>
+    <cs:fillRef idx="0"/>
+    <cs:effectRef idx="0"/>
+    <cs:fontRef idx="minor">
+      <a:schemeClr val="tx1">
+        <a:lumMod val="65000"/>
+        <a:lumOff val="35000"/>
+      </a:schemeClr>
+    </cs:fontRef>
+    <cs:defRPr sz="1400" b="0" kern="1200" spc="0" baseline="0"/>
+  </cs:title>
+  <cs:trendline>
+    <cs:lnRef idx="0">
+      <cs:styleClr val="auto"/>
+    </cs:lnRef>
+    <cs:fillRef idx="0"/>
+    <cs:effectRef idx="0"/>
+    <cs:fontRef idx="minor">
+      <a:schemeClr val="tx1"/>
+    </cs:fontRef>
+    <cs:spPr>
+      <a:ln w="19050" cap="rnd">
+        <a:solidFill>
+          <a:schemeClr val="phClr"/>
+        </a:solidFill>
+        <a:prstDash val="sysDot"/>
+      </a:ln>
+    </cs:spPr>
+  </cs:trendline>
+  <cs:trendlineLabel>
+    <cs:lnRef idx="0"/>
+    <cs:fillRef idx="0"/>
+    <cs:effectRef idx="0"/>
+    <cs:fontRef idx="minor">
+      <a:schemeClr val="tx1">
+        <a:lumMod val="65000"/>
+        <a:lumOff val="35000"/>
+      </a:schemeClr>
+    </cs:fontRef>
+    <cs:defRPr sz="900" kern="1200"/>
+  </cs:trendlineLabel>
+  <cs:upBar>
+    <cs:lnRef idx="0"/>
+    <cs:fillRef idx="0"/>
+    <cs:effectRef idx="0"/>
+    <cs:fontRef idx="minor">
+      <a:schemeClr val="dk1"/>
+    </cs:fontRef>
+    <cs:spPr>
+      <a:solidFill>
+        <a:schemeClr val="lt1"/>
+      </a:solidFill>
+      <a:ln w="9525">
+        <a:solidFill>
+          <a:schemeClr val="tx1">
+            <a:lumMod val="15000"/>
+            <a:lumOff val="85000"/>
+          </a:schemeClr>
+        </a:solidFill>
+      </a:ln>
+    </cs:spPr>
+  </cs:upBar>
+  <cs:valueAxis>
+    <cs:lnRef idx="0"/>
+    <cs:fillRef idx="0"/>
+    <cs:effectRef idx="0"/>
+    <cs:fontRef idx="minor">
+      <a:schemeClr val="tx1">
+        <a:lumMod val="65000"/>
+        <a:lumOff val="35000"/>
+      </a:schemeClr>
+    </cs:fontRef>
+    <cs:defRPr sz="900" kern="1200"/>
+  </cs:valueAxis>
+  <cs:wall>
+    <cs:lnRef idx="0"/>
+    <cs:fillRef idx="0"/>
+    <cs:effectRef idx="0"/>
+    <cs:fontRef idx="minor">
+      <a:schemeClr val="tx1"/>
+    </cs:fontRef>
+    <cs:spPr>
+      <a:noFill/>
+      <a:ln>
+        <a:noFill/>
+      </a:ln>
+    </cs:spPr>
+  </cs:wall>
+</cs:chartStyle>
+</file>
+
+<file path=ppt/drawings/drawing1.xml><?xml version="1.0" encoding="utf-8"?>
+<c:userShapes xmlns:c="http://schemas.openxmlformats.org/drawingml/2006/chart">
+  <cdr:relSizeAnchor xmlns:cdr="http://schemas.openxmlformats.org/drawingml/2006/chartDrawing">
+    <cdr:from>
+      <cdr:x>0.08593</cdr:x>
+      <cdr:y>0.2133</cdr:y>
+    </cdr:from>
+    <cdr:to>
+      <cdr:x>0.38135</cdr:x>
+      <cdr:y>0.54664</cdr:y>
+    </cdr:to>
+    <cdr:sp macro="" textlink="">
+      <cdr:nvSpPr>
+        <cdr:cNvPr id="2" name="TextBox 1"/>
+        <cdr:cNvSpPr txBox="1"/>
+      </cdr:nvSpPr>
+      <cdr:spPr>
+        <a:xfrm xmlns:a="http://schemas.openxmlformats.org/drawingml/2006/main">
+          <a:off x="392884" y="585132"/>
+          <a:ext cx="1350628" cy="914400"/>
+        </a:xfrm>
+        <a:prstGeom xmlns:a="http://schemas.openxmlformats.org/drawingml/2006/main" prst="rect">
+          <a:avLst/>
+        </a:prstGeom>
+      </cdr:spPr>
+      <cdr:txBody>
+        <a:bodyPr xmlns:a="http://schemas.openxmlformats.org/drawingml/2006/main" vertOverflow="clip" wrap="none" rtlCol="0"/>
+        <a:lstStyle xmlns:a="http://schemas.openxmlformats.org/drawingml/2006/main"/>
+        <a:p xmlns:a="http://schemas.openxmlformats.org/drawingml/2006/main">
+          <a:r>
+            <a:rPr lang="en-US" sz="1100" dirty="0"/>
+            <a:t>Text on drawing</a:t>
+          </a:r>
+        </a:p>
+      </cdr:txBody>
+    </cdr:sp>
+  </cdr:relSizeAnchor>
+</c:userShapes>
+</file>
+
 <file path=ppt/slideLayouts/slideLayout1.xml><?xml version="1.0" encoding="utf-8"?>
 <p:sldLayout xmlns:a="http://schemas.openxmlformats.org/drawingml/2006/main" xmlns:r="http://schemas.openxmlformats.org/officeDocument/2006/relationships" xmlns:p="http://schemas.openxmlformats.org/presentationml/2006/main" type="title" preserve="1">
   <p:cSld name="Title Slide">
@@ -155,10 +1010,9 @@
           </a:lstStyle>
           <a:p>
             <a:r>
-              <a:rPr lang="en-US" smtClean="0"/>
+              <a:rPr lang="en-US"/>
               <a:t>Click to edit Master title style</a:t>
             </a:r>
-            <a:endParaRPr lang="en-US"/>
           </a:p>
         </p:txBody>
       </p:sp>
@@ -220,10 +1074,9 @@
           </a:lstStyle>
           <a:p>
             <a:r>
-              <a:rPr lang="en-US" smtClean="0"/>
+              <a:rPr lang="en-US"/>
               <a:t>Click to edit Master subtitle style</a:t>
             </a:r>
-            <a:endParaRPr lang="en-US"/>
           </a:p>
         </p:txBody>
       </p:sp>
@@ -244,7 +1097,7 @@
           <a:p>
             <a:fld id="{2432AF1E-3485-458C-94B8-A564C9C6DD54}" type="datetimeFigureOut">
               <a:rPr lang="en-US" smtClean="0"/>
-              <a:t>8/10/2017</a:t>
+              <a:t>3/21/2018</a:t>
             </a:fld>
             <a:endParaRPr lang="en-US"/>
           </a:p>
@@ -338,10 +1191,9 @@
           <a:lstStyle/>
           <a:p>
             <a:r>
-              <a:rPr lang="en-US" smtClean="0"/>
+              <a:rPr lang="en-US"/>
               <a:t>Click to edit Master title style</a:t>
             </a:r>
-            <a:endParaRPr lang="en-US"/>
           </a:p>
         </p:txBody>
       </p:sp>
@@ -362,38 +1214,37 @@
           <a:p>
             <a:pPr lvl="0"/>
             <a:r>
-              <a:rPr lang="en-US" smtClean="0"/>
+              <a:rPr lang="en-US"/>
               <a:t>Click to edit Master text styles</a:t>
             </a:r>
           </a:p>
           <a:p>
             <a:pPr lvl="1"/>
             <a:r>
-              <a:rPr lang="en-US" smtClean="0"/>
+              <a:rPr lang="en-US"/>
               <a:t>Second level</a:t>
             </a:r>
           </a:p>
           <a:p>
             <a:pPr lvl="2"/>
             <a:r>
-              <a:rPr lang="en-US" smtClean="0"/>
+              <a:rPr lang="en-US"/>
               <a:t>Third level</a:t>
             </a:r>
           </a:p>
           <a:p>
             <a:pPr lvl="3"/>
             <a:r>
-              <a:rPr lang="en-US" smtClean="0"/>
+              <a:rPr lang="en-US"/>
               <a:t>Fourth level</a:t>
             </a:r>
           </a:p>
           <a:p>
             <a:pPr lvl="4"/>
             <a:r>
-              <a:rPr lang="en-US" smtClean="0"/>
+              <a:rPr lang="en-US"/>
               <a:t>Fifth level</a:t>
             </a:r>
-            <a:endParaRPr lang="en-US"/>
           </a:p>
         </p:txBody>
       </p:sp>
@@ -414,7 +1265,7 @@
           <a:p>
             <a:fld id="{2432AF1E-3485-458C-94B8-A564C9C6DD54}" type="datetimeFigureOut">
               <a:rPr lang="en-US" smtClean="0"/>
-              <a:t>8/10/2017</a:t>
+              <a:t>3/21/2018</a:t>
             </a:fld>
             <a:endParaRPr lang="en-US"/>
           </a:p>
@@ -513,10 +1364,9 @@
           <a:lstStyle/>
           <a:p>
             <a:r>
-              <a:rPr lang="en-US" smtClean="0"/>
+              <a:rPr lang="en-US"/>
               <a:t>Click to edit Master title style</a:t>
             </a:r>
-            <a:endParaRPr lang="en-US"/>
           </a:p>
         </p:txBody>
       </p:sp>
@@ -542,38 +1392,37 @@
           <a:p>
             <a:pPr lvl="0"/>
             <a:r>
-              <a:rPr lang="en-US" smtClean="0"/>
+              <a:rPr lang="en-US"/>
               <a:t>Click to edit Master text styles</a:t>
             </a:r>
           </a:p>
           <a:p>
             <a:pPr lvl="1"/>
             <a:r>
-              <a:rPr lang="en-US" smtClean="0"/>
+              <a:rPr lang="en-US"/>
               <a:t>Second level</a:t>
             </a:r>
           </a:p>
           <a:p>
             <a:pPr lvl="2"/>
             <a:r>
-              <a:rPr lang="en-US" smtClean="0"/>
+              <a:rPr lang="en-US"/>
               <a:t>Third level</a:t>
             </a:r>
           </a:p>
           <a:p>
             <a:pPr lvl="3"/>
             <a:r>
-              <a:rPr lang="en-US" smtClean="0"/>
+              <a:rPr lang="en-US"/>
               <a:t>Fourth level</a:t>
             </a:r>
           </a:p>
           <a:p>
             <a:pPr lvl="4"/>
             <a:r>
-              <a:rPr lang="en-US" smtClean="0"/>
+              <a:rPr lang="en-US"/>
               <a:t>Fifth level</a:t>
             </a:r>
-            <a:endParaRPr lang="en-US"/>
           </a:p>
         </p:txBody>
       </p:sp>
@@ -594,7 +1443,7 @@
           <a:p>
             <a:fld id="{2432AF1E-3485-458C-94B8-A564C9C6DD54}" type="datetimeFigureOut">
               <a:rPr lang="en-US" smtClean="0"/>
-              <a:t>8/10/2017</a:t>
+              <a:t>3/21/2018</a:t>
             </a:fld>
             <a:endParaRPr lang="en-US"/>
           </a:p>
@@ -688,10 +1537,9 @@
           <a:lstStyle/>
           <a:p>
             <a:r>
-              <a:rPr lang="en-US" smtClean="0"/>
+              <a:rPr lang="en-US"/>
               <a:t>Click to edit Master title style</a:t>
             </a:r>
-            <a:endParaRPr lang="en-US"/>
           </a:p>
         </p:txBody>
       </p:sp>
@@ -712,38 +1560,37 @@
           <a:p>
             <a:pPr lvl="0"/>
             <a:r>
-              <a:rPr lang="en-US" smtClean="0"/>
+              <a:rPr lang="en-US"/>
               <a:t>Click to edit Master text styles</a:t>
             </a:r>
           </a:p>
           <a:p>
             <a:pPr lvl="1"/>
             <a:r>
-              <a:rPr lang="en-US" smtClean="0"/>
+              <a:rPr lang="en-US"/>
               <a:t>Second level</a:t>
             </a:r>
           </a:p>
           <a:p>
             <a:pPr lvl="2"/>
             <a:r>
-              <a:rPr lang="en-US" smtClean="0"/>
+              <a:rPr lang="en-US"/>
               <a:t>Third level</a:t>
             </a:r>
           </a:p>
           <a:p>
             <a:pPr lvl="3"/>
             <a:r>
-              <a:rPr lang="en-US" smtClean="0"/>
+              <a:rPr lang="en-US"/>
               <a:t>Fourth level</a:t>
             </a:r>
           </a:p>
           <a:p>
             <a:pPr lvl="4"/>
             <a:r>
-              <a:rPr lang="en-US" smtClean="0"/>
+              <a:rPr lang="en-US"/>
               <a:t>Fifth level</a:t>
             </a:r>
-            <a:endParaRPr lang="en-US"/>
           </a:p>
         </p:txBody>
       </p:sp>
@@ -764,7 +1611,7 @@
           <a:p>
             <a:fld id="{2432AF1E-3485-458C-94B8-A564C9C6DD54}" type="datetimeFigureOut">
               <a:rPr lang="en-US" smtClean="0"/>
-              <a:t>8/10/2017</a:t>
+              <a:t>3/21/2018</a:t>
             </a:fld>
             <a:endParaRPr lang="en-US"/>
           </a:p>
@@ -867,10 +1714,9 @@
           </a:lstStyle>
           <a:p>
             <a:r>
-              <a:rPr lang="en-US" smtClean="0"/>
+              <a:rPr lang="en-US"/>
               <a:t>Click to edit Master title style</a:t>
             </a:r>
-            <a:endParaRPr lang="en-US"/>
           </a:p>
         </p:txBody>
       </p:sp>
@@ -987,7 +1833,7 @@
           <a:p>
             <a:pPr lvl="0"/>
             <a:r>
-              <a:rPr lang="en-US" smtClean="0"/>
+              <a:rPr lang="en-US"/>
               <a:t>Click to edit Master text styles</a:t>
             </a:r>
           </a:p>
@@ -1010,7 +1856,7 @@
           <a:p>
             <a:fld id="{2432AF1E-3485-458C-94B8-A564C9C6DD54}" type="datetimeFigureOut">
               <a:rPr lang="en-US" smtClean="0"/>
-              <a:t>8/10/2017</a:t>
+              <a:t>3/21/2018</a:t>
             </a:fld>
             <a:endParaRPr lang="en-US"/>
           </a:p>
@@ -1104,10 +1950,9 @@
           <a:lstStyle/>
           <a:p>
             <a:r>
-              <a:rPr lang="en-US" smtClean="0"/>
+              <a:rPr lang="en-US"/>
               <a:t>Click to edit Master title style</a:t>
             </a:r>
-            <a:endParaRPr lang="en-US"/>
           </a:p>
         </p:txBody>
       </p:sp>
@@ -1133,38 +1978,37 @@
           <a:p>
             <a:pPr lvl="0"/>
             <a:r>
-              <a:rPr lang="en-US" smtClean="0"/>
+              <a:rPr lang="en-US"/>
               <a:t>Click to edit Master text styles</a:t>
             </a:r>
           </a:p>
           <a:p>
             <a:pPr lvl="1"/>
             <a:r>
-              <a:rPr lang="en-US" smtClean="0"/>
+              <a:rPr lang="en-US"/>
               <a:t>Second level</a:t>
             </a:r>
           </a:p>
           <a:p>
             <a:pPr lvl="2"/>
             <a:r>
-              <a:rPr lang="en-US" smtClean="0"/>
+              <a:rPr lang="en-US"/>
               <a:t>Third level</a:t>
             </a:r>
           </a:p>
           <a:p>
             <a:pPr lvl="3"/>
             <a:r>
-              <a:rPr lang="en-US" smtClean="0"/>
+              <a:rPr lang="en-US"/>
               <a:t>Fourth level</a:t>
             </a:r>
           </a:p>
           <a:p>
             <a:pPr lvl="4"/>
             <a:r>
-              <a:rPr lang="en-US" smtClean="0"/>
+              <a:rPr lang="en-US"/>
               <a:t>Fifth level</a:t>
             </a:r>
-            <a:endParaRPr lang="en-US"/>
           </a:p>
         </p:txBody>
       </p:sp>
@@ -1190,38 +2034,37 @@
           <a:p>
             <a:pPr lvl="0"/>
             <a:r>
-              <a:rPr lang="en-US" smtClean="0"/>
+              <a:rPr lang="en-US"/>
               <a:t>Click to edit Master text styles</a:t>
             </a:r>
           </a:p>
           <a:p>
             <a:pPr lvl="1"/>
             <a:r>
-              <a:rPr lang="en-US" smtClean="0"/>
+              <a:rPr lang="en-US"/>
               <a:t>Second level</a:t>
             </a:r>
           </a:p>
           <a:p>
             <a:pPr lvl="2"/>
             <a:r>
-              <a:rPr lang="en-US" smtClean="0"/>
+              <a:rPr lang="en-US"/>
               <a:t>Third level</a:t>
             </a:r>
           </a:p>
           <a:p>
             <a:pPr lvl="3"/>
             <a:r>
-              <a:rPr lang="en-US" smtClean="0"/>
+              <a:rPr lang="en-US"/>
               <a:t>Fourth level</a:t>
             </a:r>
           </a:p>
           <a:p>
             <a:pPr lvl="4"/>
             <a:r>
-              <a:rPr lang="en-US" smtClean="0"/>
+              <a:rPr lang="en-US"/>
               <a:t>Fifth level</a:t>
             </a:r>
-            <a:endParaRPr lang="en-US"/>
           </a:p>
         </p:txBody>
       </p:sp>
@@ -1242,7 +2085,7 @@
           <a:p>
             <a:fld id="{2432AF1E-3485-458C-94B8-A564C9C6DD54}" type="datetimeFigureOut">
               <a:rPr lang="en-US" smtClean="0"/>
-              <a:t>8/10/2017</a:t>
+              <a:t>3/21/2018</a:t>
             </a:fld>
             <a:endParaRPr lang="en-US"/>
           </a:p>
@@ -1341,10 +2184,9 @@
           <a:lstStyle/>
           <a:p>
             <a:r>
-              <a:rPr lang="en-US" smtClean="0"/>
+              <a:rPr lang="en-US"/>
               <a:t>Click to edit Master title style</a:t>
             </a:r>
-            <a:endParaRPr lang="en-US"/>
           </a:p>
         </p:txBody>
       </p:sp>
@@ -1407,7 +2249,7 @@
           <a:p>
             <a:pPr lvl="0"/>
             <a:r>
-              <a:rPr lang="en-US" smtClean="0"/>
+              <a:rPr lang="en-US"/>
               <a:t>Click to edit Master text styles</a:t>
             </a:r>
           </a:p>
@@ -1435,38 +2277,37 @@
           <a:p>
             <a:pPr lvl="0"/>
             <a:r>
-              <a:rPr lang="en-US" smtClean="0"/>
+              <a:rPr lang="en-US"/>
               <a:t>Click to edit Master text styles</a:t>
             </a:r>
           </a:p>
           <a:p>
             <a:pPr lvl="1"/>
             <a:r>
-              <a:rPr lang="en-US" smtClean="0"/>
+              <a:rPr lang="en-US"/>
               <a:t>Second level</a:t>
             </a:r>
           </a:p>
           <a:p>
             <a:pPr lvl="2"/>
             <a:r>
-              <a:rPr lang="en-US" smtClean="0"/>
+              <a:rPr lang="en-US"/>
               <a:t>Third level</a:t>
             </a:r>
           </a:p>
           <a:p>
             <a:pPr lvl="3"/>
             <a:r>
-              <a:rPr lang="en-US" smtClean="0"/>
+              <a:rPr lang="en-US"/>
               <a:t>Fourth level</a:t>
             </a:r>
           </a:p>
           <a:p>
             <a:pPr lvl="4"/>
             <a:r>
-              <a:rPr lang="en-US" smtClean="0"/>
+              <a:rPr lang="en-US"/>
               <a:t>Fifth level</a:t>
             </a:r>
-            <a:endParaRPr lang="en-US"/>
           </a:p>
         </p:txBody>
       </p:sp>
@@ -1529,7 +2370,7 @@
           <a:p>
             <a:pPr lvl="0"/>
             <a:r>
-              <a:rPr lang="en-US" smtClean="0"/>
+              <a:rPr lang="en-US"/>
               <a:t>Click to edit Master text styles</a:t>
             </a:r>
           </a:p>
@@ -1557,38 +2398,37 @@
           <a:p>
             <a:pPr lvl="0"/>
             <a:r>
-              <a:rPr lang="en-US" smtClean="0"/>
+              <a:rPr lang="en-US"/>
               <a:t>Click to edit Master text styles</a:t>
             </a:r>
           </a:p>
           <a:p>
             <a:pPr lvl="1"/>
             <a:r>
-              <a:rPr lang="en-US" smtClean="0"/>
+              <a:rPr lang="en-US"/>
               <a:t>Second level</a:t>
             </a:r>
           </a:p>
           <a:p>
             <a:pPr lvl="2"/>
             <a:r>
-              <a:rPr lang="en-US" smtClean="0"/>
+              <a:rPr lang="en-US"/>
               <a:t>Third level</a:t>
             </a:r>
           </a:p>
           <a:p>
             <a:pPr lvl="3"/>
             <a:r>
-              <a:rPr lang="en-US" smtClean="0"/>
+              <a:rPr lang="en-US"/>
               <a:t>Fourth level</a:t>
             </a:r>
           </a:p>
           <a:p>
             <a:pPr lvl="4"/>
             <a:r>
-              <a:rPr lang="en-US" smtClean="0"/>
+              <a:rPr lang="en-US"/>
               <a:t>Fifth level</a:t>
             </a:r>
-            <a:endParaRPr lang="en-US"/>
           </a:p>
         </p:txBody>
       </p:sp>
@@ -1609,7 +2449,7 @@
           <a:p>
             <a:fld id="{2432AF1E-3485-458C-94B8-A564C9C6DD54}" type="datetimeFigureOut">
               <a:rPr lang="en-US" smtClean="0"/>
-              <a:t>8/10/2017</a:t>
+              <a:t>3/21/2018</a:t>
             </a:fld>
             <a:endParaRPr lang="en-US"/>
           </a:p>
@@ -1703,10 +2543,9 @@
           <a:lstStyle/>
           <a:p>
             <a:r>
-              <a:rPr lang="en-US" smtClean="0"/>
+              <a:rPr lang="en-US"/>
               <a:t>Click to edit Master title style</a:t>
             </a:r>
-            <a:endParaRPr lang="en-US"/>
           </a:p>
         </p:txBody>
       </p:sp>
@@ -1727,7 +2566,7 @@
           <a:p>
             <a:fld id="{2432AF1E-3485-458C-94B8-A564C9C6DD54}" type="datetimeFigureOut">
               <a:rPr lang="en-US" smtClean="0"/>
-              <a:t>8/10/2017</a:t>
+              <a:t>3/21/2018</a:t>
             </a:fld>
             <a:endParaRPr lang="en-US"/>
           </a:p>
@@ -1822,7 +2661,7 @@
           <a:p>
             <a:fld id="{2432AF1E-3485-458C-94B8-A564C9C6DD54}" type="datetimeFigureOut">
               <a:rPr lang="en-US" smtClean="0"/>
-              <a:t>8/10/2017</a:t>
+              <a:t>3/21/2018</a:t>
             </a:fld>
             <a:endParaRPr lang="en-US"/>
           </a:p>
@@ -1925,10 +2764,9 @@
           </a:lstStyle>
           <a:p>
             <a:r>
-              <a:rPr lang="en-US" smtClean="0"/>
+              <a:rPr lang="en-US"/>
               <a:t>Click to edit Master title style</a:t>
             </a:r>
-            <a:endParaRPr lang="en-US"/>
           </a:p>
         </p:txBody>
       </p:sp>
@@ -1982,38 +2820,37 @@
           <a:p>
             <a:pPr lvl="0"/>
             <a:r>
-              <a:rPr lang="en-US" smtClean="0"/>
+              <a:rPr lang="en-US"/>
               <a:t>Click to edit Master text styles</a:t>
             </a:r>
           </a:p>
           <a:p>
             <a:pPr lvl="1"/>
             <a:r>
-              <a:rPr lang="en-US" smtClean="0"/>
+              <a:rPr lang="en-US"/>
               <a:t>Second level</a:t>
             </a:r>
           </a:p>
           <a:p>
             <a:pPr lvl="2"/>
             <a:r>
-              <a:rPr lang="en-US" smtClean="0"/>
+              <a:rPr lang="en-US"/>
               <a:t>Third level</a:t>
             </a:r>
           </a:p>
           <a:p>
             <a:pPr lvl="3"/>
             <a:r>
-              <a:rPr lang="en-US" smtClean="0"/>
+              <a:rPr lang="en-US"/>
               <a:t>Fourth level</a:t>
             </a:r>
           </a:p>
           <a:p>
             <a:pPr lvl="4"/>
             <a:r>
-              <a:rPr lang="en-US" smtClean="0"/>
+              <a:rPr lang="en-US"/>
               <a:t>Fifth level</a:t>
             </a:r>
-            <a:endParaRPr lang="en-US"/>
           </a:p>
         </p:txBody>
       </p:sp>
@@ -2076,7 +2913,7 @@
           <a:p>
             <a:pPr lvl="0"/>
             <a:r>
-              <a:rPr lang="en-US" smtClean="0"/>
+              <a:rPr lang="en-US"/>
               <a:t>Click to edit Master text styles</a:t>
             </a:r>
           </a:p>
@@ -2099,7 +2936,7 @@
           <a:p>
             <a:fld id="{2432AF1E-3485-458C-94B8-A564C9C6DD54}" type="datetimeFigureOut">
               <a:rPr lang="en-US" smtClean="0"/>
-              <a:t>8/10/2017</a:t>
+              <a:t>3/21/2018</a:t>
             </a:fld>
             <a:endParaRPr lang="en-US"/>
           </a:p>
@@ -2202,10 +3039,9 @@
           </a:lstStyle>
           <a:p>
             <a:r>
-              <a:rPr lang="en-US" smtClean="0"/>
+              <a:rPr lang="en-US"/>
               <a:t>Click to edit Master title style</a:t>
             </a:r>
-            <a:endParaRPr lang="en-US"/>
           </a:p>
         </p:txBody>
       </p:sp>
@@ -2329,7 +3165,7 @@
           <a:p>
             <a:pPr lvl="0"/>
             <a:r>
-              <a:rPr lang="en-US" smtClean="0"/>
+              <a:rPr lang="en-US"/>
               <a:t>Click to edit Master text styles</a:t>
             </a:r>
           </a:p>
@@ -2352,7 +3188,7 @@
           <a:p>
             <a:fld id="{2432AF1E-3485-458C-94B8-A564C9C6DD54}" type="datetimeFigureOut">
               <a:rPr lang="en-US" smtClean="0"/>
-              <a:t>8/10/2017</a:t>
+              <a:t>3/21/2018</a:t>
             </a:fld>
             <a:endParaRPr lang="en-US"/>
           </a:p>
@@ -2461,10 +3297,9 @@
           <a:lstStyle/>
           <a:p>
             <a:r>
-              <a:rPr lang="en-US" smtClean="0"/>
+              <a:rPr lang="en-US"/>
               <a:t>Click to edit Master title style</a:t>
             </a:r>
-            <a:endParaRPr lang="en-US"/>
           </a:p>
         </p:txBody>
       </p:sp>
@@ -2495,38 +3330,37 @@
           <a:p>
             <a:pPr lvl="0"/>
             <a:r>
-              <a:rPr lang="en-US" smtClean="0"/>
+              <a:rPr lang="en-US"/>
               <a:t>Click to edit Master text styles</a:t>
             </a:r>
           </a:p>
           <a:p>
             <a:pPr lvl="1"/>
             <a:r>
-              <a:rPr lang="en-US" smtClean="0"/>
+              <a:rPr lang="en-US"/>
               <a:t>Second level</a:t>
             </a:r>
           </a:p>
           <a:p>
             <a:pPr lvl="2"/>
             <a:r>
-              <a:rPr lang="en-US" smtClean="0"/>
+              <a:rPr lang="en-US"/>
               <a:t>Third level</a:t>
             </a:r>
           </a:p>
           <a:p>
             <a:pPr lvl="3"/>
             <a:r>
-              <a:rPr lang="en-US" smtClean="0"/>
+              <a:rPr lang="en-US"/>
               <a:t>Fourth level</a:t>
             </a:r>
           </a:p>
           <a:p>
             <a:pPr lvl="4"/>
             <a:r>
-              <a:rPr lang="en-US" smtClean="0"/>
+              <a:rPr lang="en-US"/>
               <a:t>Fifth level</a:t>
             </a:r>
-            <a:endParaRPr lang="en-US"/>
           </a:p>
         </p:txBody>
       </p:sp>
@@ -2565,7 +3399,7 @@
           <a:p>
             <a:fld id="{2432AF1E-3485-458C-94B8-A564C9C6DD54}" type="datetimeFigureOut">
               <a:rPr lang="en-US" smtClean="0"/>
-              <a:t>8/10/2017</a:t>
+              <a:t>3/21/2018</a:t>
             </a:fld>
             <a:endParaRPr lang="en-US"/>
           </a:p>
@@ -2986,10 +3820,9 @@
           <a:lstStyle/>
           <a:p>
             <a:r>
-              <a:rPr lang="en-US" dirty="0" smtClean="0"/>
+              <a:rPr lang="en-US" dirty="0"/>
               <a:t>Some text</a:t>
             </a:r>
-            <a:endParaRPr lang="en-US" dirty="0"/>
           </a:p>
         </p:txBody>
       </p:sp>
@@ -3009,10 +3842,9 @@
           <a:lstStyle/>
           <a:p>
             <a:r>
-              <a:rPr lang="en-US" dirty="0" smtClean="0"/>
+              <a:rPr lang="en-US" dirty="0"/>
               <a:t>Another text</a:t>
             </a:r>
-            <a:endParaRPr lang="en-US" dirty="0"/>
           </a:p>
         </p:txBody>
       </p:sp>
@@ -3062,10 +3894,9 @@
           <a:lstStyle/>
           <a:p>
             <a:r>
-              <a:rPr lang="en-US" dirty="0" smtClean="0"/>
+              <a:rPr lang="en-US" dirty="0"/>
               <a:t>Another slide</a:t>
             </a:r>
-            <a:endParaRPr lang="en-US" dirty="0"/>
           </a:p>
         </p:txBody>
       </p:sp>
@@ -3085,14 +3916,13 @@
           <a:lstStyle/>
           <a:p>
             <a:r>
-              <a:rPr lang="en-US" dirty="0" smtClean="0"/>
+              <a:rPr lang="en-US" dirty="0"/>
               <a:t>A bit </a:t>
             </a:r>
             <a:r>
-              <a:rPr lang="en-US" smtClean="0"/>
+              <a:rPr lang="en-US"/>
               <a:t>more text</a:t>
             </a:r>
-            <a:endParaRPr lang="en-US"/>
           </a:p>
         </p:txBody>
       </p:sp>
@@ -3100,6 +3930,66 @@
     <p:extLst>
       <p:ext uri="{BB962C8B-B14F-4D97-AF65-F5344CB8AC3E}">
         <p14:creationId xmlns:p14="http://schemas.microsoft.com/office/powerpoint/2010/main" val="857283384"/>
+      </p:ext>
+    </p:extLst>
+  </p:cSld>
+  <p:clrMapOvr>
+    <a:masterClrMapping/>
+  </p:clrMapOvr>
+</p:sld>
+</file>
+
+<file path=ppt/slides/slide3.xml><?xml version="1.0" encoding="utf-8"?>
+<p:sld xmlns:a="http://schemas.openxmlformats.org/drawingml/2006/main" xmlns:r="http://schemas.openxmlformats.org/officeDocument/2006/relationships" xmlns:p="http://schemas.openxmlformats.org/presentationml/2006/main">
+  <p:cSld>
+    <p:spTree>
+      <p:nvGrpSpPr>
+        <p:cNvPr id="1" name=""/>
+        <p:cNvGrpSpPr/>
+        <p:nvPr/>
+      </p:nvGrpSpPr>
+      <p:grpSpPr>
+        <a:xfrm>
+          <a:off x="0" y="0"/>
+          <a:ext cx="0" cy="0"/>
+          <a:chOff x="0" y="0"/>
+          <a:chExt cx="0" cy="0"/>
+        </a:xfrm>
+      </p:grpSpPr>
+      <p:graphicFrame>
+        <p:nvGraphicFramePr>
+          <p:cNvPr id="5" name="Chart 4">
+            <a:extLst>
+              <a:ext uri="{FF2B5EF4-FFF2-40B4-BE49-F238E27FC236}">
+                <a16:creationId xmlns:a16="http://schemas.microsoft.com/office/drawing/2014/main" id="{0545BD87-EFFF-46F3-BCE7-677A1D27F745}"/>
+              </a:ext>
+            </a:extLst>
+          </p:cNvPr>
+          <p:cNvGraphicFramePr>
+            <a:graphicFrameLocks/>
+          </p:cNvGraphicFramePr>
+          <p:nvPr>
+            <p:extLst>
+              <p:ext uri="{D42A27DB-BD31-4B8C-83A1-F6EECF244321}">
+                <p14:modId xmlns:p14="http://schemas.microsoft.com/office/powerpoint/2010/main" val="1278513205"/>
+              </p:ext>
+            </p:extLst>
+          </p:nvPr>
+        </p:nvGraphicFramePr>
+        <p:xfrm>
+          <a:off x="3810000" y="2057400"/>
+          <a:ext cx="4572000" cy="2743200"/>
+        </p:xfrm>
+        <a:graphic>
+          <a:graphicData uri="http://schemas.openxmlformats.org/drawingml/2006/chart">
+            <c:chart xmlns:c="http://schemas.openxmlformats.org/drawingml/2006/chart" xmlns:r="http://schemas.openxmlformats.org/officeDocument/2006/relationships" r:id="rId2"/>
+          </a:graphicData>
+        </a:graphic>
+      </p:graphicFrame>
+    </p:spTree>
+    <p:extLst>
+      <p:ext uri="{BB962C8B-B14F-4D97-AF65-F5344CB8AC3E}">
+        <p14:creationId xmlns:p14="http://schemas.microsoft.com/office/powerpoint/2010/main" val="74181523"/>
       </p:ext>
     </p:extLst>
   </p:cSld>

</xml_diff>